<commit_message>
update slides to 2019 cshl template
</commit_message>
<xml_diff>
--- a/assets/lectures/cshl/2019/mini/RNASeq_MiniLecture_02_02_Indexing.pptx
+++ b/assets/lectures/cshl/2019/mini/RNASeq_MiniLecture_02_02_Indexing.pptx
@@ -8,7 +8,7 @@
     <p:notesMasterId r:id="rId8"/>
   </p:notesMasterIdLst>
   <p:sldIdLst>
-    <p:sldId id="259" r:id="rId2"/>
+    <p:sldId id="515" r:id="rId2"/>
     <p:sldId id="260" r:id="rId3"/>
     <p:sldId id="264" r:id="rId4"/>
     <p:sldId id="263" r:id="rId5"/>
@@ -202,7 +202,7 @@
           <a:p>
             <a:fld id="{827BD9F9-8452-A342-BB1B-28ECF19E2CC5}" type="datetimeFigureOut">
               <a:rPr lang="en-US" smtClean="0"/>
-              <a:t>6/10/19</a:t>
+              <a:t>11/5/19</a:t>
             </a:fld>
             <a:endParaRPr lang="en-US"/>
           </a:p>
@@ -1601,6 +1601,145 @@
 </p:sldLayout>
 </file>
 
+<file path=ppt/slideLayouts/slideLayout13.xml><?xml version="1.0" encoding="utf-8"?>
+<p:sldLayout xmlns:a="http://schemas.openxmlformats.org/drawingml/2006/main" xmlns:r="http://schemas.openxmlformats.org/officeDocument/2006/relationships" xmlns:p="http://schemas.openxmlformats.org/presentationml/2006/main" userDrawn="1">
+  <p:cSld name="Title">
+    <p:spTree>
+      <p:nvGrpSpPr>
+        <p:cNvPr id="1" name=""/>
+        <p:cNvGrpSpPr/>
+        <p:nvPr/>
+      </p:nvGrpSpPr>
+      <p:grpSpPr>
+        <a:xfrm>
+          <a:off x="0" y="0"/>
+          <a:ext cx="0" cy="0"/>
+          <a:chOff x="0" y="0"/>
+          <a:chExt cx="0" cy="0"/>
+        </a:xfrm>
+      </p:grpSpPr>
+      <p:sp>
+        <p:nvSpPr>
+          <p:cNvPr id="2" name="Rectangle 1"/>
+          <p:cNvSpPr/>
+          <p:nvPr userDrawn="1"/>
+        </p:nvSpPr>
+        <p:spPr>
+          <a:xfrm>
+            <a:off x="0" y="0"/>
+            <a:ext cx="12192000" cy="2514600"/>
+          </a:xfrm>
+          <a:prstGeom prst="rect">
+            <a:avLst/>
+          </a:prstGeom>
+          <a:solidFill>
+            <a:schemeClr val="tx1"/>
+          </a:solidFill>
+          <a:ln>
+            <a:noFill/>
+          </a:ln>
+        </p:spPr>
+        <p:style>
+          <a:lnRef idx="2">
+            <a:schemeClr val="accent1">
+              <a:shade val="50000"/>
+            </a:schemeClr>
+          </a:lnRef>
+          <a:fillRef idx="1">
+            <a:schemeClr val="accent1"/>
+          </a:fillRef>
+          <a:effectRef idx="0">
+            <a:schemeClr val="accent1"/>
+          </a:effectRef>
+          <a:fontRef idx="minor">
+            <a:schemeClr val="lt1"/>
+          </a:fontRef>
+        </p:style>
+        <p:txBody>
+          <a:bodyPr anchor="ctr"/>
+          <a:lstStyle/>
+          <a:p>
+            <a:pPr algn="ctr">
+              <a:defRPr/>
+            </a:pPr>
+            <a:endParaRPr lang="en-US" sz="1350">
+              <a:solidFill>
+                <a:srgbClr val="FFFFFF"/>
+              </a:solidFill>
+              <a:latin typeface="Segoe UI" charset="0"/>
+              <a:ea typeface="ＭＳ Ｐゴシック" charset="0"/>
+              <a:cs typeface="ＭＳ Ｐゴシック" charset="0"/>
+            </a:endParaRPr>
+          </a:p>
+        </p:txBody>
+      </p:sp>
+      <p:pic>
+        <p:nvPicPr>
+          <p:cNvPr id="3" name="Picture 7" descr="cshl_logo_alternate rgb.png"/>
+          <p:cNvPicPr>
+            <a:picLocks noChangeAspect="1"/>
+          </p:cNvPicPr>
+          <p:nvPr userDrawn="1"/>
+        </p:nvPicPr>
+        <p:blipFill>
+          <a:blip r:embed="rId2">
+            <a:extLst>
+              <a:ext uri="{28A0092B-C50C-407E-A947-70E740481C1C}">
+                <a14:useLocalDpi xmlns:a14="http://schemas.microsoft.com/office/drawing/2010/main" val="0"/>
+              </a:ext>
+            </a:extLst>
+          </a:blip>
+          <a:srcRect/>
+          <a:stretch>
+            <a:fillRect/>
+          </a:stretch>
+        </p:blipFill>
+        <p:spPr bwMode="auto">
+          <a:xfrm>
+            <a:off x="400052" y="381000"/>
+            <a:ext cx="4679949" cy="1676400"/>
+          </a:xfrm>
+          <a:prstGeom prst="rect">
+            <a:avLst/>
+          </a:prstGeom>
+          <a:noFill/>
+          <a:ln>
+            <a:noFill/>
+          </a:ln>
+          <a:extLst>
+            <a:ext uri="{909E8E84-426E-40dd-AFC4-6F175D3DCCD1}">
+              <a14:hiddenFill xmlns="" xmlns:a14="http://schemas.microsoft.com/office/drawing/2010/main">
+                <a:solidFill>
+                  <a:srgbClr val="FFFFFF"/>
+                </a:solidFill>
+              </a14:hiddenFill>
+            </a:ext>
+            <a:ext uri="{91240B29-F687-4f45-9708-019B960494DF}">
+              <a14:hiddenLine xmlns="" xmlns:a14="http://schemas.microsoft.com/office/drawing/2010/main" w="9525">
+                <a:solidFill>
+                  <a:srgbClr val="000000"/>
+                </a:solidFill>
+                <a:miter lim="800000"/>
+                <a:headEnd/>
+                <a:tailEnd/>
+              </a14:hiddenLine>
+            </a:ext>
+          </a:extLst>
+        </p:spPr>
+      </p:pic>
+    </p:spTree>
+    <p:extLst>
+      <p:ext uri="{BB962C8B-B14F-4D97-AF65-F5344CB8AC3E}">
+        <p14:creationId xmlns:p14="http://schemas.microsoft.com/office/powerpoint/2010/main" val="3451094123"/>
+      </p:ext>
+    </p:extLst>
+  </p:cSld>
+  <p:clrMapOvr>
+    <a:masterClrMapping/>
+  </p:clrMapOvr>
+</p:sldLayout>
+</file>
+
 <file path=ppt/slideLayouts/slideLayout2.xml><?xml version="1.0" encoding="utf-8"?>
 <p:sldLayout xmlns:a="http://schemas.openxmlformats.org/drawingml/2006/main" xmlns:r="http://schemas.openxmlformats.org/officeDocument/2006/relationships" xmlns:p="http://schemas.openxmlformats.org/presentationml/2006/main" type="obj" preserve="1">
   <p:cSld name="Title and Content">
@@ -3891,6 +4030,7 @@
     <p:sldLayoutId id="2147483670" r:id="rId10"/>
     <p:sldLayoutId id="2147483671" r:id="rId11"/>
     <p:sldLayoutId id="2147483673" r:id="rId12"/>
+    <p:sldLayoutId id="2147483674" r:id="rId13"/>
   </p:sldLayoutIdLst>
   <p:txStyles>
     <p:titleStyle>
@@ -4194,234 +4334,69 @@
       </p:grpSpPr>
       <p:sp>
         <p:nvSpPr>
-          <p:cNvPr id="2" name="Title 1">
-            <a:extLst>
-              <a:ext uri="{FF2B5EF4-FFF2-40B4-BE49-F238E27FC236}">
-                <a16:creationId xmlns:a16="http://schemas.microsoft.com/office/drawing/2014/main" id="{47807894-EFFE-CD45-AEFD-BFB62D406E86}"/>
-              </a:ext>
-            </a:extLst>
-          </p:cNvPr>
-          <p:cNvSpPr>
-            <a:spLocks noGrp="1"/>
-          </p:cNvSpPr>
-          <p:nvPr>
-            <p:ph type="ctrTitle"/>
-          </p:nvPr>
+          <p:cNvPr id="57" name="Rectangle 56"/>
+          <p:cNvSpPr/>
+          <p:nvPr/>
         </p:nvSpPr>
         <p:spPr>
           <a:xfrm>
-            <a:off x="3048000" y="-1300203"/>
-            <a:ext cx="9144000" cy="2387600"/>
-          </a:xfrm>
-        </p:spPr>
-        <p:txBody>
-          <a:bodyPr>
-            <a:normAutofit/>
-          </a:bodyPr>
-          <a:lstStyle/>
-          <a:p>
-            <a:pPr algn="r"/>
-            <a:r>
-              <a:rPr lang="en-US" sz="3600" dirty="0">
-                <a:solidFill>
-                  <a:schemeClr val="bg1"/>
-                </a:solidFill>
-                <a:latin typeface="Calibri" charset="0"/>
-                <a:cs typeface="Segoe UI" charset="0"/>
-              </a:rPr>
-              <a:t>RNA-Seq Module 2</a:t>
-            </a:r>
-            <a:br>
-              <a:rPr lang="en-US" sz="3600" dirty="0">
-                <a:solidFill>
-                  <a:schemeClr val="bg1"/>
-                </a:solidFill>
-                <a:latin typeface="Calibri" charset="0"/>
-                <a:cs typeface="Segoe UI" charset="0"/>
-              </a:rPr>
-            </a:br>
-            <a:r>
-              <a:rPr lang="en-US" sz="3600" dirty="0">
-                <a:solidFill>
-                  <a:schemeClr val="bg1"/>
-                </a:solidFill>
-                <a:latin typeface="Calibri" charset="0"/>
-                <a:cs typeface="Segoe UI" charset="0"/>
-              </a:rPr>
-              <a:t>Indexing</a:t>
-            </a:r>
-            <a:endParaRPr lang="en-US" sz="3200" b="1" dirty="0">
-              <a:solidFill>
-                <a:schemeClr val="bg1"/>
-              </a:solidFill>
-              <a:latin typeface="Calibri" charset="0"/>
-              <a:cs typeface="Segoe UI" charset="0"/>
-            </a:endParaRPr>
-          </a:p>
-        </p:txBody>
-      </p:sp>
-      <p:sp>
-        <p:nvSpPr>
-          <p:cNvPr id="3" name="Subtitle 2">
-            <a:extLst>
-              <a:ext uri="{FF2B5EF4-FFF2-40B4-BE49-F238E27FC236}">
-                <a16:creationId xmlns:a16="http://schemas.microsoft.com/office/drawing/2014/main" id="{6E120BC9-7354-2449-9237-C9C284B728D9}"/>
-              </a:ext>
-            </a:extLst>
-          </p:cNvPr>
-          <p:cNvSpPr>
-            <a:spLocks noGrp="1"/>
-          </p:cNvSpPr>
-          <p:nvPr>
-            <p:ph type="subTitle" idx="1"/>
-          </p:nvPr>
-        </p:nvSpPr>
-        <p:spPr>
-          <a:xfrm>
-            <a:off x="3048000" y="1087397"/>
-            <a:ext cx="9144000" cy="1655762"/>
-          </a:xfrm>
-        </p:spPr>
-        <p:txBody>
-          <a:bodyPr/>
-          <a:lstStyle/>
-          <a:p>
-            <a:pPr algn="r"/>
-            <a:r>
-              <a:rPr lang="en-US" dirty="0">
-                <a:solidFill>
-                  <a:schemeClr val="bg1"/>
-                </a:solidFill>
-              </a:rPr>
-              <a:t>Kelsy Cotto, Malachi Griffith, Obi Griffith, Megan </a:t>
-            </a:r>
-            <a:r>
-              <a:rPr lang="en-US" dirty="0" err="1">
-                <a:solidFill>
-                  <a:schemeClr val="bg1"/>
-                </a:solidFill>
-              </a:rPr>
-              <a:t>Richters</a:t>
-            </a:r>
-            <a:endParaRPr lang="en-US" dirty="0">
-              <a:solidFill>
-                <a:schemeClr val="bg1"/>
-              </a:solidFill>
-            </a:endParaRPr>
-          </a:p>
-        </p:txBody>
-      </p:sp>
-      <p:sp>
-        <p:nvSpPr>
-          <p:cNvPr id="5" name="TextBox 4">
-            <a:extLst>
-              <a:ext uri="{FF2B5EF4-FFF2-40B4-BE49-F238E27FC236}">
-                <a16:creationId xmlns:a16="http://schemas.microsoft.com/office/drawing/2014/main" id="{11B4D090-3D05-0D43-847B-63C2AA7B1C1E}"/>
-              </a:ext>
-            </a:extLst>
-          </p:cNvPr>
-          <p:cNvSpPr txBox="1"/>
-          <p:nvPr/>
-        </p:nvSpPr>
-        <p:spPr>
-          <a:xfrm>
-            <a:off x="1781299" y="3503221"/>
-            <a:ext cx="2172135" cy="369332"/>
+            <a:off x="1524001" y="2514601"/>
+            <a:ext cx="5758249" cy="3898557"/>
           </a:xfrm>
           <a:prstGeom prst="rect">
             <a:avLst/>
           </a:prstGeom>
-          <a:noFill/>
+          <a:solidFill>
+            <a:schemeClr val="accent1">
+              <a:alpha val="18000"/>
+            </a:schemeClr>
+          </a:solidFill>
+          <a:ln>
+            <a:noFill/>
+          </a:ln>
         </p:spPr>
-        <p:txBody>
-          <a:bodyPr wrap="square" rtlCol="0">
-            <a:spAutoFit/>
-          </a:bodyPr>
+        <p:style>
+          <a:lnRef idx="1">
+            <a:schemeClr val="accent1"/>
+          </a:lnRef>
+          <a:fillRef idx="3">
+            <a:schemeClr val="accent1"/>
+          </a:fillRef>
+          <a:effectRef idx="2">
+            <a:schemeClr val="accent1"/>
+          </a:effectRef>
+          <a:fontRef idx="minor">
+            <a:schemeClr val="lt1"/>
+          </a:fontRef>
+        </p:style>
+        <p:txBody>
+          <a:bodyPr anchor="ctr"/>
           <a:lstStyle/>
           <a:p>
-            <a:pPr marL="0" marR="0" lvl="0" indent="0" algn="l" defTabSz="914400" rtl="0" eaLnBrk="1" fontAlgn="auto" latinLnBrk="0" hangingPunct="1">
-              <a:lnSpc>
-                <a:spcPct val="100000"/>
-              </a:lnSpc>
-              <a:spcBef>
-                <a:spcPts val="0"/>
-              </a:spcBef>
-              <a:spcAft>
-                <a:spcPts val="0"/>
-              </a:spcAft>
-              <a:buClrTx/>
-              <a:buSzTx/>
-              <a:buFontTx/>
-              <a:buNone/>
-              <a:tabLst/>
+            <a:pPr algn="ctr">
               <a:defRPr/>
             </a:pPr>
-            <a:r>
-              <a:rPr kumimoji="0" lang="en-US" sz="1800" b="0" i="0" u="none" strike="noStrike" kern="1200" cap="none" spc="0" normalizeH="0" baseline="0" noProof="0" dirty="0">
-                <a:ln>
-                  <a:noFill/>
-                </a:ln>
-                <a:solidFill>
-                  <a:prstClr val="black"/>
-                </a:solidFill>
-                <a:effectLst/>
-                <a:uLnTx/>
-                <a:uFillTx/>
-                <a:latin typeface="Verdana" panose="020B0604030504040204"/>
-                <a:ea typeface="+mn-ea"/>
-                <a:cs typeface="+mn-cs"/>
-              </a:rPr>
-              <a:t>Workshop icon</a:t>
-            </a:r>
+            <a:endParaRPr lang="en-US">
+              <a:solidFill>
+                <a:srgbClr val="FFFFFF"/>
+              </a:solidFill>
+              <a:latin typeface="Calibri" charset="0"/>
+              <a:ea typeface="ＭＳ Ｐゴシック" charset="0"/>
+              <a:cs typeface="Calibri" charset="0"/>
+            </a:endParaRPr>
           </a:p>
         </p:txBody>
       </p:sp>
       <p:pic>
         <p:nvPicPr>
-          <p:cNvPr id="8" name="Picture 7">
-            <a:extLst>
-              <a:ext uri="{FF2B5EF4-FFF2-40B4-BE49-F238E27FC236}">
-                <a16:creationId xmlns:a16="http://schemas.microsoft.com/office/drawing/2014/main" id="{B1FD4585-05BC-264C-9D0B-8CF2936028AB}"/>
-              </a:ext>
-            </a:extLst>
-          </p:cNvPr>
+          <p:cNvPr id="10242" name="Picture 4" descr="TGI_logo_V_2color_bevel.tiff"/>
           <p:cNvPicPr>
             <a:picLocks noChangeAspect="1"/>
           </p:cNvPicPr>
           <p:nvPr/>
         </p:nvPicPr>
         <p:blipFill>
-          <a:blip r:embed="rId2"/>
-          <a:stretch>
-            <a:fillRect/>
-          </a:stretch>
-        </p:blipFill>
-        <p:spPr>
-          <a:xfrm>
-            <a:off x="1781299" y="2619633"/>
-            <a:ext cx="3632886" cy="3632886"/>
-          </a:xfrm>
-          <a:prstGeom prst="rect">
-            <a:avLst/>
-          </a:prstGeom>
-        </p:spPr>
-      </p:pic>
-      <p:pic>
-        <p:nvPicPr>
-          <p:cNvPr id="9" name="Picture 4" descr="TGI_logo_V_2color_bevel.tiff">
-            <a:extLst>
-              <a:ext uri="{FF2B5EF4-FFF2-40B4-BE49-F238E27FC236}">
-                <a16:creationId xmlns:a16="http://schemas.microsoft.com/office/drawing/2014/main" id="{DEC0B3E1-84C4-934F-B1C6-6164B26ED359}"/>
-              </a:ext>
-            </a:extLst>
-          </p:cNvPr>
-          <p:cNvPicPr>
-            <a:picLocks noChangeAspect="1"/>
-          </p:cNvPicPr>
-          <p:nvPr/>
-        </p:nvPicPr>
-        <p:blipFill>
-          <a:blip r:embed="rId3">
+          <a:blip r:embed="rId2">
             <a:extLst>
               <a:ext uri="{28A0092B-C50C-407E-A947-70E740481C1C}">
                 <a14:useLocalDpi xmlns:a14="http://schemas.microsoft.com/office/drawing/2010/main" val="0"/>
@@ -4435,8 +4410,8 @@
         </p:blipFill>
         <p:spPr bwMode="auto">
           <a:xfrm>
-            <a:off x="8506866" y="3326484"/>
-            <a:ext cx="2555875" cy="2219183"/>
+            <a:off x="8112126" y="3744914"/>
+            <a:ext cx="2181225" cy="1893887"/>
           </a:xfrm>
           <a:prstGeom prst="rect">
             <a:avLst/>
@@ -4466,10 +4441,447 @@
           </a:extLst>
         </p:spPr>
       </p:pic>
+      <p:pic>
+        <p:nvPicPr>
+          <p:cNvPr id="2" name="Picture 1" descr="DataCenter.jpg"/>
+          <p:cNvPicPr>
+            <a:picLocks noChangeAspect="1"/>
+          </p:cNvPicPr>
+          <p:nvPr/>
+        </p:nvPicPr>
+        <p:blipFill>
+          <a:blip r:embed="rId3" cstate="print">
+            <a:extLst>
+              <a:ext uri="{28A0092B-C50C-407E-A947-70E740481C1C}">
+                <a14:useLocalDpi xmlns:a14="http://schemas.microsoft.com/office/drawing/2010/main" val="0"/>
+              </a:ext>
+            </a:extLst>
+          </a:blip>
+          <a:stretch>
+            <a:fillRect/>
+          </a:stretch>
+        </p:blipFill>
+        <p:spPr>
+          <a:xfrm>
+            <a:off x="1703513" y="2708921"/>
+            <a:ext cx="5133893" cy="3422595"/>
+          </a:xfrm>
+          <a:prstGeom prst="rect">
+            <a:avLst/>
+          </a:prstGeom>
+        </p:spPr>
+      </p:pic>
+      <p:sp>
+        <p:nvSpPr>
+          <p:cNvPr id="7" name="Title 1">
+            <a:extLst>
+              <a:ext uri="{FF2B5EF4-FFF2-40B4-BE49-F238E27FC236}">
+                <a16:creationId xmlns:a16="http://schemas.microsoft.com/office/drawing/2014/main" id="{A11EB652-D19B-3146-BD1E-BFCBA6FE97A3}"/>
+              </a:ext>
+            </a:extLst>
+          </p:cNvPr>
+          <p:cNvSpPr txBox="1">
+            <a:spLocks/>
+          </p:cNvSpPr>
+          <p:nvPr/>
+        </p:nvSpPr>
+        <p:spPr>
+          <a:xfrm>
+            <a:off x="3048000" y="141514"/>
+            <a:ext cx="9144000" cy="1314188"/>
+          </a:xfrm>
+          <a:prstGeom prst="rect">
+            <a:avLst/>
+          </a:prstGeom>
+        </p:spPr>
+        <p:txBody>
+          <a:bodyPr>
+            <a:normAutofit/>
+          </a:bodyPr>
+          <a:lstStyle>
+            <a:lvl1pPr algn="l" defTabSz="914400" rtl="0" eaLnBrk="1" latinLnBrk="0" hangingPunct="1">
+              <a:lnSpc>
+                <a:spcPct val="90000"/>
+              </a:lnSpc>
+              <a:spcBef>
+                <a:spcPct val="0"/>
+              </a:spcBef>
+              <a:buNone/>
+              <a:defRPr sz="4400" kern="1200">
+                <a:solidFill>
+                  <a:schemeClr val="tx1"/>
+                </a:solidFill>
+                <a:latin typeface="+mj-lt"/>
+                <a:ea typeface="+mj-ea"/>
+                <a:cs typeface="+mj-cs"/>
+              </a:defRPr>
+            </a:lvl1pPr>
+          </a:lstStyle>
+          <a:p>
+            <a:pPr algn="r"/>
+            <a:r>
+              <a:rPr lang="en-US" sz="3600" dirty="0">
+                <a:solidFill>
+                  <a:schemeClr val="bg1"/>
+                </a:solidFill>
+                <a:latin typeface="Calibri" charset="0"/>
+                <a:cs typeface="Segoe UI" charset="0"/>
+              </a:rPr>
+              <a:t>RNA-Seq Module 2</a:t>
+            </a:r>
+            <a:br>
+              <a:rPr lang="en-US" sz="3600" dirty="0">
+                <a:solidFill>
+                  <a:schemeClr val="bg1"/>
+                </a:solidFill>
+                <a:latin typeface="Calibri" charset="0"/>
+                <a:cs typeface="Segoe UI" charset="0"/>
+              </a:rPr>
+            </a:br>
+            <a:r>
+              <a:rPr lang="en-US" sz="3600" dirty="0">
+                <a:solidFill>
+                  <a:schemeClr val="bg1"/>
+                </a:solidFill>
+                <a:latin typeface="Calibri" charset="0"/>
+                <a:cs typeface="Segoe UI" charset="0"/>
+              </a:rPr>
+              <a:t>Indexing</a:t>
+            </a:r>
+            <a:endParaRPr lang="en-US" sz="3200" b="1" dirty="0">
+              <a:solidFill>
+                <a:schemeClr val="bg1"/>
+              </a:solidFill>
+              <a:latin typeface="Calibri" charset="0"/>
+              <a:cs typeface="Segoe UI" charset="0"/>
+            </a:endParaRPr>
+          </a:p>
+        </p:txBody>
+      </p:sp>
+      <p:sp>
+        <p:nvSpPr>
+          <p:cNvPr id="9" name="Subtitle 2">
+            <a:extLst>
+              <a:ext uri="{FF2B5EF4-FFF2-40B4-BE49-F238E27FC236}">
+                <a16:creationId xmlns:a16="http://schemas.microsoft.com/office/drawing/2014/main" id="{7C50790C-8D87-CC4F-B926-F48A53F94152}"/>
+              </a:ext>
+            </a:extLst>
+          </p:cNvPr>
+          <p:cNvSpPr txBox="1">
+            <a:spLocks/>
+          </p:cNvSpPr>
+          <p:nvPr/>
+        </p:nvSpPr>
+        <p:spPr>
+          <a:xfrm>
+            <a:off x="3483428" y="1379500"/>
+            <a:ext cx="8708571" cy="1314188"/>
+          </a:xfrm>
+          <a:prstGeom prst="rect">
+            <a:avLst/>
+          </a:prstGeom>
+        </p:spPr>
+        <p:txBody>
+          <a:bodyPr>
+            <a:normAutofit/>
+          </a:bodyPr>
+          <a:lstStyle>
+            <a:lvl1pPr marL="228600" indent="-228600" algn="l" defTabSz="914400" rtl="0" eaLnBrk="1" latinLnBrk="0" hangingPunct="1">
+              <a:lnSpc>
+                <a:spcPct val="90000"/>
+              </a:lnSpc>
+              <a:spcBef>
+                <a:spcPts val="1000"/>
+              </a:spcBef>
+              <a:buFont typeface="Arial" panose="020B0604020202020204" pitchFamily="34" charset="0"/>
+              <a:buChar char="•"/>
+              <a:defRPr sz="2800" kern="1200">
+                <a:solidFill>
+                  <a:schemeClr val="tx1"/>
+                </a:solidFill>
+                <a:latin typeface="+mn-lt"/>
+                <a:ea typeface="+mn-ea"/>
+                <a:cs typeface="+mn-cs"/>
+              </a:defRPr>
+            </a:lvl1pPr>
+            <a:lvl2pPr marL="685800" indent="-228600" algn="l" defTabSz="914400" rtl="0" eaLnBrk="1" latinLnBrk="0" hangingPunct="1">
+              <a:lnSpc>
+                <a:spcPct val="90000"/>
+              </a:lnSpc>
+              <a:spcBef>
+                <a:spcPts val="500"/>
+              </a:spcBef>
+              <a:buFont typeface="Arial" panose="020B0604020202020204" pitchFamily="34" charset="0"/>
+              <a:buChar char="•"/>
+              <a:defRPr sz="2400" kern="1200">
+                <a:solidFill>
+                  <a:schemeClr val="tx1"/>
+                </a:solidFill>
+                <a:latin typeface="+mn-lt"/>
+                <a:ea typeface="+mn-ea"/>
+                <a:cs typeface="+mn-cs"/>
+              </a:defRPr>
+            </a:lvl2pPr>
+            <a:lvl3pPr marL="1143000" indent="-228600" algn="l" defTabSz="914400" rtl="0" eaLnBrk="1" latinLnBrk="0" hangingPunct="1">
+              <a:lnSpc>
+                <a:spcPct val="90000"/>
+              </a:lnSpc>
+              <a:spcBef>
+                <a:spcPts val="500"/>
+              </a:spcBef>
+              <a:buFont typeface="Arial" panose="020B0604020202020204" pitchFamily="34" charset="0"/>
+              <a:buChar char="•"/>
+              <a:defRPr sz="2000" kern="1200">
+                <a:solidFill>
+                  <a:schemeClr val="tx1"/>
+                </a:solidFill>
+                <a:latin typeface="+mn-lt"/>
+                <a:ea typeface="+mn-ea"/>
+                <a:cs typeface="+mn-cs"/>
+              </a:defRPr>
+            </a:lvl3pPr>
+            <a:lvl4pPr marL="1600200" indent="-228600" algn="l" defTabSz="914400" rtl="0" eaLnBrk="1" latinLnBrk="0" hangingPunct="1">
+              <a:lnSpc>
+                <a:spcPct val="90000"/>
+              </a:lnSpc>
+              <a:spcBef>
+                <a:spcPts val="500"/>
+              </a:spcBef>
+              <a:buFont typeface="Arial" panose="020B0604020202020204" pitchFamily="34" charset="0"/>
+              <a:buChar char="•"/>
+              <a:defRPr sz="1800" kern="1200">
+                <a:solidFill>
+                  <a:schemeClr val="tx1"/>
+                </a:solidFill>
+                <a:latin typeface="+mn-lt"/>
+                <a:ea typeface="+mn-ea"/>
+                <a:cs typeface="+mn-cs"/>
+              </a:defRPr>
+            </a:lvl4pPr>
+            <a:lvl5pPr marL="2057400" indent="-228600" algn="l" defTabSz="914400" rtl="0" eaLnBrk="1" latinLnBrk="0" hangingPunct="1">
+              <a:lnSpc>
+                <a:spcPct val="90000"/>
+              </a:lnSpc>
+              <a:spcBef>
+                <a:spcPts val="500"/>
+              </a:spcBef>
+              <a:buFont typeface="Arial" panose="020B0604020202020204" pitchFamily="34" charset="0"/>
+              <a:buChar char="•"/>
+              <a:defRPr sz="1800" kern="1200">
+                <a:solidFill>
+                  <a:schemeClr val="tx1"/>
+                </a:solidFill>
+                <a:latin typeface="+mn-lt"/>
+                <a:ea typeface="+mn-ea"/>
+                <a:cs typeface="+mn-cs"/>
+              </a:defRPr>
+            </a:lvl5pPr>
+            <a:lvl6pPr marL="2514600" indent="-228600" algn="l" defTabSz="914400" rtl="0" eaLnBrk="1" latinLnBrk="0" hangingPunct="1">
+              <a:lnSpc>
+                <a:spcPct val="90000"/>
+              </a:lnSpc>
+              <a:spcBef>
+                <a:spcPts val="500"/>
+              </a:spcBef>
+              <a:buFont typeface="Arial" panose="020B0604020202020204" pitchFamily="34" charset="0"/>
+              <a:buChar char="•"/>
+              <a:defRPr sz="1800" kern="1200">
+                <a:solidFill>
+                  <a:schemeClr val="tx1"/>
+                </a:solidFill>
+                <a:latin typeface="+mn-lt"/>
+                <a:ea typeface="+mn-ea"/>
+                <a:cs typeface="+mn-cs"/>
+              </a:defRPr>
+            </a:lvl6pPr>
+            <a:lvl7pPr marL="2971800" indent="-228600" algn="l" defTabSz="914400" rtl="0" eaLnBrk="1" latinLnBrk="0" hangingPunct="1">
+              <a:lnSpc>
+                <a:spcPct val="90000"/>
+              </a:lnSpc>
+              <a:spcBef>
+                <a:spcPts val="500"/>
+              </a:spcBef>
+              <a:buFont typeface="Arial" panose="020B0604020202020204" pitchFamily="34" charset="0"/>
+              <a:buChar char="•"/>
+              <a:defRPr sz="1800" kern="1200">
+                <a:solidFill>
+                  <a:schemeClr val="tx1"/>
+                </a:solidFill>
+                <a:latin typeface="+mn-lt"/>
+                <a:ea typeface="+mn-ea"/>
+                <a:cs typeface="+mn-cs"/>
+              </a:defRPr>
+            </a:lvl7pPr>
+            <a:lvl8pPr marL="3429000" indent="-228600" algn="l" defTabSz="914400" rtl="0" eaLnBrk="1" latinLnBrk="0" hangingPunct="1">
+              <a:lnSpc>
+                <a:spcPct val="90000"/>
+              </a:lnSpc>
+              <a:spcBef>
+                <a:spcPts val="500"/>
+              </a:spcBef>
+              <a:buFont typeface="Arial" panose="020B0604020202020204" pitchFamily="34" charset="0"/>
+              <a:buChar char="•"/>
+              <a:defRPr sz="1800" kern="1200">
+                <a:solidFill>
+                  <a:schemeClr val="tx1"/>
+                </a:solidFill>
+                <a:latin typeface="+mn-lt"/>
+                <a:ea typeface="+mn-ea"/>
+                <a:cs typeface="+mn-cs"/>
+              </a:defRPr>
+            </a:lvl8pPr>
+            <a:lvl9pPr marL="3886200" indent="-228600" algn="l" defTabSz="914400" rtl="0" eaLnBrk="1" latinLnBrk="0" hangingPunct="1">
+              <a:lnSpc>
+                <a:spcPct val="90000"/>
+              </a:lnSpc>
+              <a:spcBef>
+                <a:spcPts val="500"/>
+              </a:spcBef>
+              <a:buFont typeface="Arial" panose="020B0604020202020204" pitchFamily="34" charset="0"/>
+              <a:buChar char="•"/>
+              <a:defRPr sz="1800" kern="1200">
+                <a:solidFill>
+                  <a:schemeClr val="tx1"/>
+                </a:solidFill>
+                <a:latin typeface="+mn-lt"/>
+                <a:ea typeface="+mn-ea"/>
+                <a:cs typeface="+mn-cs"/>
+              </a:defRPr>
+            </a:lvl9pPr>
+          </a:lstStyle>
+          <a:p>
+            <a:pPr marL="0" indent="0" algn="r">
+              <a:lnSpc>
+                <a:spcPct val="100000"/>
+              </a:lnSpc>
+              <a:spcBef>
+                <a:spcPts val="0"/>
+              </a:spcBef>
+              <a:buNone/>
+              <a:defRPr/>
+            </a:pPr>
+            <a:r>
+              <a:rPr lang="en-US" sz="1800" dirty="0">
+                <a:solidFill>
+                  <a:schemeClr val="bg1"/>
+                </a:solidFill>
+                <a:latin typeface="Calibri"/>
+                <a:cs typeface="Calibri"/>
+              </a:rPr>
+              <a:t>Kelsy Cotto, Felicia Gomez,</a:t>
+            </a:r>
+          </a:p>
+          <a:p>
+            <a:pPr marL="0" indent="0" algn="r">
+              <a:lnSpc>
+                <a:spcPct val="100000"/>
+              </a:lnSpc>
+              <a:spcBef>
+                <a:spcPts val="0"/>
+              </a:spcBef>
+              <a:buNone/>
+              <a:defRPr/>
+            </a:pPr>
+            <a:r>
+              <a:rPr lang="en-US" sz="1800" dirty="0">
+                <a:solidFill>
+                  <a:schemeClr val="bg1"/>
+                </a:solidFill>
+                <a:latin typeface="Calibri"/>
+                <a:cs typeface="Calibri"/>
+              </a:rPr>
+              <a:t>Obi Griffith, Malachi Griffith, </a:t>
+            </a:r>
+            <a:r>
+              <a:rPr lang="en-US" sz="1800" dirty="0" err="1">
+                <a:solidFill>
+                  <a:schemeClr val="bg1"/>
+                </a:solidFill>
+                <a:latin typeface="Calibri"/>
+                <a:cs typeface="Calibri"/>
+              </a:rPr>
+              <a:t>Huiming</a:t>
+            </a:r>
+            <a:r>
+              <a:rPr lang="en-US" sz="1800" dirty="0">
+                <a:solidFill>
+                  <a:schemeClr val="bg1"/>
+                </a:solidFill>
+                <a:latin typeface="Calibri"/>
+                <a:cs typeface="Calibri"/>
+              </a:rPr>
+              <a:t> Xia</a:t>
+            </a:r>
+          </a:p>
+          <a:p>
+            <a:pPr marL="0" indent="0" algn="r">
+              <a:lnSpc>
+                <a:spcPct val="100000"/>
+              </a:lnSpc>
+              <a:spcBef>
+                <a:spcPts val="0"/>
+              </a:spcBef>
+              <a:buNone/>
+              <a:defRPr/>
+            </a:pPr>
+            <a:r>
+              <a:rPr lang="en-US" sz="1800" dirty="0">
+                <a:ln w="1270">
+                  <a:solidFill>
+                    <a:prstClr val="black">
+                      <a:alpha val="38000"/>
+                    </a:prstClr>
+                  </a:solidFill>
+                </a:ln>
+                <a:solidFill>
+                  <a:schemeClr val="bg1"/>
+                </a:solidFill>
+                <a:latin typeface="Calibri"/>
+                <a:cs typeface="Calibri"/>
+              </a:rPr>
+              <a:t>Advanced Sequencing Technologies &amp; Applications</a:t>
+            </a:r>
+          </a:p>
+          <a:p>
+            <a:pPr marL="0" indent="0" algn="r">
+              <a:lnSpc>
+                <a:spcPct val="100000"/>
+              </a:lnSpc>
+              <a:spcBef>
+                <a:spcPts val="0"/>
+              </a:spcBef>
+              <a:buNone/>
+              <a:defRPr/>
+            </a:pPr>
+            <a:r>
+              <a:rPr lang="en-US" sz="1600" dirty="0">
+                <a:ln w="1270">
+                  <a:solidFill>
+                    <a:prstClr val="black">
+                      <a:alpha val="38000"/>
+                    </a:prstClr>
+                  </a:solidFill>
+                </a:ln>
+                <a:solidFill>
+                  <a:schemeClr val="bg1"/>
+                </a:solidFill>
+                <a:latin typeface="Calibri"/>
+                <a:cs typeface="Calibri"/>
+              </a:rPr>
+              <a:t>November 5- 16, 2019</a:t>
+            </a:r>
+            <a:endParaRPr lang="en-US" dirty="0">
+              <a:solidFill>
+                <a:schemeClr val="bg1"/>
+              </a:solidFill>
+            </a:endParaRPr>
+          </a:p>
+        </p:txBody>
+      </p:sp>
     </p:spTree>
     <p:extLst>
       <p:ext uri="{BB962C8B-B14F-4D97-AF65-F5344CB8AC3E}">
-        <p14:creationId xmlns:p14="http://schemas.microsoft.com/office/powerpoint/2010/main" val="1702947648"/>
+        <p14:creationId xmlns:p14="http://schemas.microsoft.com/office/powerpoint/2010/main" val="3487310769"/>
       </p:ext>
     </p:extLst>
   </p:cSld>

</xml_diff>